<commit_message>
update orientation for new amxEuler.m
</commit_message>
<xml_diff>
--- a/Manual/AMX_labeled.pptx
+++ b/Manual/AMX_labeled.pptx
@@ -259,7 +259,7 @@
           <a:p>
             <a:fld id="{BC9BAC97-C7D2-43F9-9795-662CA3038553}" type="datetimeFigureOut">
               <a:rPr lang="en-US" smtClean="0"/>
-              <a:t>12/5/2019</a:t>
+              <a:t>12/18/2019</a:t>
             </a:fld>
             <a:endParaRPr lang="en-US"/>
           </a:p>
@@ -457,7 +457,7 @@
           <a:p>
             <a:fld id="{BC9BAC97-C7D2-43F9-9795-662CA3038553}" type="datetimeFigureOut">
               <a:rPr lang="en-US" smtClean="0"/>
-              <a:t>12/5/2019</a:t>
+              <a:t>12/18/2019</a:t>
             </a:fld>
             <a:endParaRPr lang="en-US"/>
           </a:p>
@@ -665,7 +665,7 @@
           <a:p>
             <a:fld id="{BC9BAC97-C7D2-43F9-9795-662CA3038553}" type="datetimeFigureOut">
               <a:rPr lang="en-US" smtClean="0"/>
-              <a:t>12/5/2019</a:t>
+              <a:t>12/18/2019</a:t>
             </a:fld>
             <a:endParaRPr lang="en-US"/>
           </a:p>
@@ -863,7 +863,7 @@
           <a:p>
             <a:fld id="{BC9BAC97-C7D2-43F9-9795-662CA3038553}" type="datetimeFigureOut">
               <a:rPr lang="en-US" smtClean="0"/>
-              <a:t>12/5/2019</a:t>
+              <a:t>12/18/2019</a:t>
             </a:fld>
             <a:endParaRPr lang="en-US"/>
           </a:p>
@@ -1138,7 +1138,7 @@
           <a:p>
             <a:fld id="{BC9BAC97-C7D2-43F9-9795-662CA3038553}" type="datetimeFigureOut">
               <a:rPr lang="en-US" smtClean="0"/>
-              <a:t>12/5/2019</a:t>
+              <a:t>12/18/2019</a:t>
             </a:fld>
             <a:endParaRPr lang="en-US"/>
           </a:p>
@@ -1403,7 +1403,7 @@
           <a:p>
             <a:fld id="{BC9BAC97-C7D2-43F9-9795-662CA3038553}" type="datetimeFigureOut">
               <a:rPr lang="en-US" smtClean="0"/>
-              <a:t>12/5/2019</a:t>
+              <a:t>12/18/2019</a:t>
             </a:fld>
             <a:endParaRPr lang="en-US"/>
           </a:p>
@@ -1815,7 +1815,7 @@
           <a:p>
             <a:fld id="{BC9BAC97-C7D2-43F9-9795-662CA3038553}" type="datetimeFigureOut">
               <a:rPr lang="en-US" smtClean="0"/>
-              <a:t>12/5/2019</a:t>
+              <a:t>12/18/2019</a:t>
             </a:fld>
             <a:endParaRPr lang="en-US"/>
           </a:p>
@@ -1956,7 +1956,7 @@
           <a:p>
             <a:fld id="{BC9BAC97-C7D2-43F9-9795-662CA3038553}" type="datetimeFigureOut">
               <a:rPr lang="en-US" smtClean="0"/>
-              <a:t>12/5/2019</a:t>
+              <a:t>12/18/2019</a:t>
             </a:fld>
             <a:endParaRPr lang="en-US"/>
           </a:p>
@@ -2069,7 +2069,7 @@
           <a:p>
             <a:fld id="{BC9BAC97-C7D2-43F9-9795-662CA3038553}" type="datetimeFigureOut">
               <a:rPr lang="en-US" smtClean="0"/>
-              <a:t>12/5/2019</a:t>
+              <a:t>12/18/2019</a:t>
             </a:fld>
             <a:endParaRPr lang="en-US"/>
           </a:p>
@@ -2380,7 +2380,7 @@
           <a:p>
             <a:fld id="{BC9BAC97-C7D2-43F9-9795-662CA3038553}" type="datetimeFigureOut">
               <a:rPr lang="en-US" smtClean="0"/>
-              <a:t>12/5/2019</a:t>
+              <a:t>12/18/2019</a:t>
             </a:fld>
             <a:endParaRPr lang="en-US"/>
           </a:p>
@@ -2668,7 +2668,7 @@
           <a:p>
             <a:fld id="{BC9BAC97-C7D2-43F9-9795-662CA3038553}" type="datetimeFigureOut">
               <a:rPr lang="en-US" smtClean="0"/>
-              <a:t>12/5/2019</a:t>
+              <a:t>12/18/2019</a:t>
             </a:fld>
             <a:endParaRPr lang="en-US"/>
           </a:p>
@@ -2909,7 +2909,7 @@
           <a:p>
             <a:fld id="{BC9BAC97-C7D2-43F9-9795-662CA3038553}" type="datetimeFigureOut">
               <a:rPr lang="en-US" smtClean="0"/>
-              <a:t>12/5/2019</a:t>
+              <a:t>12/18/2019</a:t>
             </a:fld>
             <a:endParaRPr lang="en-US"/>
           </a:p>
@@ -4114,13 +4114,15 @@
               </a:ext>
             </a:extLst>
           </p:cNvPr>
-          <p:cNvCxnSpPr/>
+          <p:cNvCxnSpPr>
+            <a:cxnSpLocks/>
+          </p:cNvCxnSpPr>
           <p:nvPr/>
         </p:nvCxnSpPr>
         <p:spPr>
-          <a:xfrm flipV="1">
-            <a:off x="9973994" y="2316040"/>
-            <a:ext cx="0" cy="1369695"/>
+          <a:xfrm flipH="1" flipV="1">
+            <a:off x="10251738" y="3072451"/>
+            <a:ext cx="682212" cy="1"/>
           </a:xfrm>
           <a:prstGeom prst="straightConnector1">
             <a:avLst/>
@@ -4198,7 +4200,7 @@
         </p:nvSpPr>
         <p:spPr>
           <a:xfrm>
-            <a:off x="10126394" y="2254881"/>
+            <a:off x="9520393" y="2918564"/>
             <a:ext cx="612668" cy="307777"/>
           </a:xfrm>
           <a:prstGeom prst="rect">
@@ -4215,6 +4217,82 @@
             <a:r>
               <a:rPr lang="en-US" sz="1400" dirty="0"/>
               <a:t>North</a:t>
+            </a:r>
+          </a:p>
+        </p:txBody>
+      </p:sp>
+      <p:cxnSp>
+        <p:nvCxnSpPr>
+          <p:cNvPr id="28" name="Straight Arrow Connector 27">
+            <a:extLst>
+              <a:ext uri="{FF2B5EF4-FFF2-40B4-BE49-F238E27FC236}">
+                <a16:creationId xmlns:a16="http://schemas.microsoft.com/office/drawing/2014/main" id="{2970C277-C3E3-4407-A7A9-E16B36B4F2B4}"/>
+              </a:ext>
+            </a:extLst>
+          </p:cNvPr>
+          <p:cNvCxnSpPr>
+            <a:cxnSpLocks/>
+          </p:cNvCxnSpPr>
+          <p:nvPr/>
+        </p:nvCxnSpPr>
+        <p:spPr>
+          <a:xfrm flipV="1">
+            <a:off x="10945900" y="2568081"/>
+            <a:ext cx="0" cy="518598"/>
+          </a:xfrm>
+          <a:prstGeom prst="straightConnector1">
+            <a:avLst/>
+          </a:prstGeom>
+          <a:ln>
+            <a:tailEnd type="triangle"/>
+          </a:ln>
+        </p:spPr>
+        <p:style>
+          <a:lnRef idx="1">
+            <a:schemeClr val="accent1"/>
+          </a:lnRef>
+          <a:fillRef idx="0">
+            <a:schemeClr val="accent1"/>
+          </a:fillRef>
+          <a:effectRef idx="0">
+            <a:schemeClr val="accent1"/>
+          </a:effectRef>
+          <a:fontRef idx="minor">
+            <a:schemeClr val="tx1"/>
+          </a:fontRef>
+        </p:style>
+      </p:cxnSp>
+      <p:sp>
+        <p:nvSpPr>
+          <p:cNvPr id="30" name="TextBox 29">
+            <a:extLst>
+              <a:ext uri="{FF2B5EF4-FFF2-40B4-BE49-F238E27FC236}">
+                <a16:creationId xmlns:a16="http://schemas.microsoft.com/office/drawing/2014/main" id="{5D8FDEAC-4F72-494F-9AF3-4C6EB1FF4064}"/>
+              </a:ext>
+            </a:extLst>
+          </p:cNvPr>
+          <p:cNvSpPr txBox="1"/>
+          <p:nvPr/>
+        </p:nvSpPr>
+        <p:spPr>
+          <a:xfrm>
+            <a:off x="10690999" y="2242507"/>
+            <a:ext cx="485902" cy="307777"/>
+          </a:xfrm>
+          <a:prstGeom prst="rect">
+            <a:avLst/>
+          </a:prstGeom>
+          <a:noFill/>
+        </p:spPr>
+        <p:txBody>
+          <a:bodyPr wrap="none" rtlCol="0">
+            <a:spAutoFit/>
+          </a:bodyPr>
+          <a:lstStyle/>
+          <a:p>
+            <a:r>
+              <a:rPr lang="en-US" sz="1400" dirty="0"/>
+              <a:t>East</a:t>
             </a:r>
           </a:p>
         </p:txBody>

</xml_diff>